<commit_message>
algorithm and odroid pictures
</commit_message>
<xml_diff>
--- a/figures/LEO+POET_backup_nikita.pptx
+++ b/figures/LEO+POET_backup_nikita.pptx
@@ -12056,7 +12056,7 @@
         <p:spPr>
           <a:xfrm>
             <a:off x="104152" y="3339021"/>
-            <a:ext cx="8963648" cy="3290379"/>
+            <a:ext cx="8735048" cy="3290379"/>
           </a:xfrm>
           <a:prstGeom prst="rect">
             <a:avLst/>
@@ -12091,7 +12091,7 @@
           <a:lstStyle/>
           <a:p>
             <a:pPr algn="ctr"/>
-            <a:endParaRPr lang="en-US">
+            <a:endParaRPr lang="en-US" sz="2000">
               <a:latin typeface="Times" charset="0"/>
               <a:ea typeface="Times" charset="0"/>
               <a:cs typeface="Times" charset="0"/>
@@ -12122,6 +12122,7 @@
           <a:ln>
             <a:tailEnd type="arrow"/>
           </a:ln>
+          <a:effectLst/>
         </p:spPr>
         <p:style>
           <a:lnRef idx="3">
@@ -12147,11 +12148,14 @@
         <p:spPr>
           <a:xfrm>
             <a:off x="2743200" y="4724399"/>
-            <a:ext cx="1219200" cy="974559"/>
+            <a:ext cx="1069761" cy="974559"/>
           </a:xfrm>
           <a:prstGeom prst="rect">
             <a:avLst/>
           </a:prstGeom>
+          <a:ln>
+            <a:noFill/>
+          </a:ln>
         </p:spPr>
         <p:style>
           <a:lnRef idx="2">
@@ -12175,7 +12179,7 @@
           <a:p>
             <a:pPr algn="ctr"/>
             <a:r>
-              <a:rPr lang="en-US" dirty="0" smtClean="0">
+              <a:rPr lang="en-US" sz="2000" dirty="0" smtClean="0">
                 <a:latin typeface="Times" charset="0"/>
                 <a:ea typeface="Times" charset="0"/>
                 <a:cs typeface="Times" charset="0"/>
@@ -12186,14 +12190,14 @@
           <a:p>
             <a:pPr algn="ctr"/>
             <a:r>
-              <a:rPr lang="en-US" dirty="0" smtClean="0">
+              <a:rPr lang="en-US" sz="2000" dirty="0" smtClean="0">
                 <a:latin typeface="Times" charset="0"/>
                 <a:ea typeface="Times" charset="0"/>
                 <a:cs typeface="Times" charset="0"/>
               </a:rPr>
               <a:t>System</a:t>
             </a:r>
-            <a:endParaRPr lang="en-US" dirty="0">
+            <a:endParaRPr lang="en-US" sz="2000" dirty="0">
               <a:latin typeface="Times" charset="0"/>
               <a:ea typeface="Times" charset="0"/>
               <a:cs typeface="Times" charset="0"/>
@@ -12210,11 +12214,14 @@
         <p:spPr>
           <a:xfrm>
             <a:off x="6335459" y="3886199"/>
-            <a:ext cx="2160841" cy="2324487"/>
+            <a:ext cx="2160841" cy="2413576"/>
           </a:xfrm>
           <a:prstGeom prst="rect">
             <a:avLst/>
           </a:prstGeom>
+          <a:ln>
+            <a:noFill/>
+          </a:ln>
         </p:spPr>
         <p:style>
           <a:lnRef idx="2">
@@ -12237,7 +12244,7 @@
           <a:lstStyle/>
           <a:p>
             <a:pPr algn="ctr"/>
-            <a:endParaRPr lang="en-US" sz="1600">
+            <a:endParaRPr lang="en-US">
               <a:latin typeface="Times" charset="0"/>
               <a:ea typeface="Times" charset="0"/>
               <a:cs typeface="Times" charset="0"/>
@@ -12341,7 +12348,7 @@
                 <a:tabLst/>
                 <a:defRPr/>
               </a:pPr>
-              <a:endParaRPr kumimoji="0" lang="en-US" sz="1400" b="0" i="0" u="none" strike="noStrike" kern="0" cap="none" spc="0" normalizeH="0" baseline="0" noProof="0">
+              <a:endParaRPr kumimoji="0" lang="en-US" sz="1600" b="0" i="0" u="none" strike="noStrike" kern="0" cap="none" spc="0" normalizeH="0" baseline="0" noProof="0">
                 <a:ln>
                   <a:noFill/>
                 </a:ln>
@@ -12440,7 +12447,7 @@
                 <a:tabLst/>
                 <a:defRPr/>
               </a:pPr>
-              <a:endParaRPr kumimoji="0" lang="en-US" sz="1400" b="0" i="0" u="none" strike="noStrike" kern="0" cap="none" spc="0" normalizeH="0" baseline="0" noProof="0">
+              <a:endParaRPr kumimoji="0" lang="en-US" sz="1600" b="0" i="0" u="none" strike="noStrike" kern="0" cap="none" spc="0" normalizeH="0" baseline="0" noProof="0">
                 <a:ln>
                   <a:noFill/>
                 </a:ln>
@@ -12509,7 +12516,7 @@
                 <a:tabLst/>
                 <a:defRPr/>
               </a:pPr>
-              <a:endParaRPr kumimoji="0" lang="en-US" sz="1400" b="0" i="0" u="none" strike="noStrike" kern="0" cap="none" spc="0" normalizeH="0" baseline="0" noProof="0">
+              <a:endParaRPr kumimoji="0" lang="en-US" sz="1600" b="0" i="0" u="none" strike="noStrike" kern="0" cap="none" spc="0" normalizeH="0" baseline="0" noProof="0">
                 <a:ln>
                   <a:noFill/>
                 </a:ln>
@@ -12578,7 +12585,7 @@
                 <a:tabLst/>
                 <a:defRPr/>
               </a:pPr>
-              <a:endParaRPr kumimoji="0" lang="en-US" sz="1400" b="0" i="0" u="none" strike="noStrike" kern="0" cap="none" spc="0" normalizeH="0" baseline="0" noProof="0">
+              <a:endParaRPr kumimoji="0" lang="en-US" sz="1600" b="0" i="0" u="none" strike="noStrike" kern="0" cap="none" spc="0" normalizeH="0" baseline="0" noProof="0">
                 <a:ln>
                   <a:noFill/>
                 </a:ln>
@@ -12647,7 +12654,7 @@
                 <a:tabLst/>
                 <a:defRPr/>
               </a:pPr>
-              <a:endParaRPr kumimoji="0" lang="en-US" sz="1400" b="0" i="0" u="none" strike="noStrike" kern="0" cap="none" spc="0" normalizeH="0" baseline="0" noProof="0">
+              <a:endParaRPr kumimoji="0" lang="en-US" sz="1600" b="0" i="0" u="none" strike="noStrike" kern="0" cap="none" spc="0" normalizeH="0" baseline="0" noProof="0">
                 <a:ln>
                   <a:noFill/>
                 </a:ln>
@@ -12716,7 +12723,7 @@
                 <a:tabLst/>
                 <a:defRPr/>
               </a:pPr>
-              <a:endParaRPr kumimoji="0" lang="en-US" sz="1400" b="0" i="0" u="none" strike="noStrike" kern="0" cap="none" spc="0" normalizeH="0" baseline="0" noProof="0">
+              <a:endParaRPr kumimoji="0" lang="en-US" sz="1600" b="0" i="0" u="none" strike="noStrike" kern="0" cap="none" spc="0" normalizeH="0" baseline="0" noProof="0">
                 <a:ln>
                   <a:noFill/>
                 </a:ln>
@@ -12785,7 +12792,7 @@
                 <a:tabLst/>
                 <a:defRPr/>
               </a:pPr>
-              <a:endParaRPr kumimoji="0" lang="en-US" sz="1400" b="0" i="0" u="none" strike="noStrike" kern="0" cap="none" spc="0" normalizeH="0" baseline="0" noProof="0">
+              <a:endParaRPr kumimoji="0" lang="en-US" sz="1600" b="0" i="0" u="none" strike="noStrike" kern="0" cap="none" spc="0" normalizeH="0" baseline="0" noProof="0">
                 <a:ln>
                   <a:noFill/>
                 </a:ln>
@@ -12854,7 +12861,7 @@
                 <a:tabLst/>
                 <a:defRPr/>
               </a:pPr>
-              <a:endParaRPr kumimoji="0" lang="en-US" sz="1400" b="0" i="0" u="none" strike="noStrike" kern="0" cap="none" spc="0" normalizeH="0" baseline="0" noProof="0">
+              <a:endParaRPr kumimoji="0" lang="en-US" sz="1600" b="0" i="0" u="none" strike="noStrike" kern="0" cap="none" spc="0" normalizeH="0" baseline="0" noProof="0">
                 <a:ln>
                   <a:noFill/>
                 </a:ln>
@@ -12968,7 +12975,7 @@
                 <a:tabLst/>
                 <a:defRPr/>
               </a:pPr>
-              <a:endParaRPr kumimoji="0" lang="en-US" sz="1400" b="0" i="0" u="none" strike="noStrike" kern="0" cap="none" spc="0" normalizeH="0" baseline="0" noProof="0">
+              <a:endParaRPr kumimoji="0" lang="en-US" sz="1600" b="0" i="0" u="none" strike="noStrike" kern="0" cap="none" spc="0" normalizeH="0" baseline="0" noProof="0">
                 <a:ln>
                   <a:noFill/>
                 </a:ln>
@@ -13067,7 +13074,7 @@
                 <a:tabLst/>
                 <a:defRPr/>
               </a:pPr>
-              <a:endParaRPr kumimoji="0" lang="en-US" sz="1400" b="0" i="0" u="none" strike="noStrike" kern="0" cap="none" spc="0" normalizeH="0" baseline="0" noProof="0">
+              <a:endParaRPr kumimoji="0" lang="en-US" sz="1600" b="0" i="0" u="none" strike="noStrike" kern="0" cap="none" spc="0" normalizeH="0" baseline="0" noProof="0">
                 <a:ln>
                   <a:noFill/>
                 </a:ln>
@@ -13136,7 +13143,7 @@
                 <a:tabLst/>
                 <a:defRPr/>
               </a:pPr>
-              <a:endParaRPr kumimoji="0" lang="en-US" sz="1400" b="0" i="0" u="none" strike="noStrike" kern="0" cap="none" spc="0" normalizeH="0" baseline="0" noProof="0">
+              <a:endParaRPr kumimoji="0" lang="en-US" sz="1600" b="0" i="0" u="none" strike="noStrike" kern="0" cap="none" spc="0" normalizeH="0" baseline="0" noProof="0">
                 <a:ln>
                   <a:noFill/>
                 </a:ln>
@@ -13205,7 +13212,7 @@
                 <a:tabLst/>
                 <a:defRPr/>
               </a:pPr>
-              <a:endParaRPr kumimoji="0" lang="en-US" sz="1400" b="0" i="0" u="none" strike="noStrike" kern="0" cap="none" spc="0" normalizeH="0" baseline="0" noProof="0">
+              <a:endParaRPr kumimoji="0" lang="en-US" sz="1600" b="0" i="0" u="none" strike="noStrike" kern="0" cap="none" spc="0" normalizeH="0" baseline="0" noProof="0">
                 <a:ln>
                   <a:noFill/>
                 </a:ln>
@@ -13274,7 +13281,7 @@
                 <a:tabLst/>
                 <a:defRPr/>
               </a:pPr>
-              <a:endParaRPr kumimoji="0" lang="en-US" sz="1400" b="0" i="0" u="none" strike="noStrike" kern="0" cap="none" spc="0" normalizeH="0" baseline="0" noProof="0">
+              <a:endParaRPr kumimoji="0" lang="en-US" sz="1600" b="0" i="0" u="none" strike="noStrike" kern="0" cap="none" spc="0" normalizeH="0" baseline="0" noProof="0">
                 <a:ln>
                   <a:noFill/>
                 </a:ln>
@@ -13343,7 +13350,7 @@
                 <a:tabLst/>
                 <a:defRPr/>
               </a:pPr>
-              <a:endParaRPr kumimoji="0" lang="en-US" sz="1400" b="0" i="0" u="none" strike="noStrike" kern="0" cap="none" spc="0" normalizeH="0" baseline="0" noProof="0">
+              <a:endParaRPr kumimoji="0" lang="en-US" sz="1600" b="0" i="0" u="none" strike="noStrike" kern="0" cap="none" spc="0" normalizeH="0" baseline="0" noProof="0">
                 <a:ln>
                   <a:noFill/>
                 </a:ln>
@@ -13412,7 +13419,7 @@
                 <a:tabLst/>
                 <a:defRPr/>
               </a:pPr>
-              <a:endParaRPr kumimoji="0" lang="en-US" sz="1400" b="0" i="0" u="none" strike="noStrike" kern="0" cap="none" spc="0" normalizeH="0" baseline="0" noProof="0">
+              <a:endParaRPr kumimoji="0" lang="en-US" sz="1600" b="0" i="0" u="none" strike="noStrike" kern="0" cap="none" spc="0" normalizeH="0" baseline="0" noProof="0">
                 <a:ln>
                   <a:noFill/>
                 </a:ln>
@@ -13481,7 +13488,7 @@
                 <a:tabLst/>
                 <a:defRPr/>
               </a:pPr>
-              <a:endParaRPr kumimoji="0" lang="en-US" sz="1400" b="0" i="0" u="none" strike="noStrike" kern="0" cap="none" spc="0" normalizeH="0" baseline="0" noProof="0">
+              <a:endParaRPr kumimoji="0" lang="en-US" sz="1600" b="0" i="0" u="none" strike="noStrike" kern="0" cap="none" spc="0" normalizeH="0" baseline="0" noProof="0">
                 <a:ln>
                   <a:noFill/>
                 </a:ln>
@@ -13507,8 +13514,8 @@
         </p:nvSpPr>
         <p:spPr>
           <a:xfrm>
-            <a:off x="6210300" y="4648200"/>
-            <a:ext cx="1181100" cy="307777"/>
+            <a:off x="6248400" y="4648200"/>
+            <a:ext cx="1181100" cy="338554"/>
           </a:xfrm>
           <a:prstGeom prst="rect">
             <a:avLst/>
@@ -13523,7 +13530,7 @@
           <a:p>
             <a:pPr algn="ctr"/>
             <a:r>
-              <a:rPr lang="en-US" sz="1400" dirty="0" smtClean="0">
+              <a:rPr lang="en-US" sz="1600" dirty="0" smtClean="0">
                 <a:solidFill>
                   <a:schemeClr val="bg1"/>
                 </a:solidFill>
@@ -13533,7 +13540,7 @@
               </a:rPr>
               <a:t>big cores</a:t>
             </a:r>
-            <a:endParaRPr lang="en-US" sz="1400" dirty="0">
+            <a:endParaRPr lang="en-US" sz="1600" dirty="0">
               <a:solidFill>
                 <a:schemeClr val="bg1"/>
               </a:solidFill>
@@ -13553,7 +13560,7 @@
         <p:spPr>
           <a:xfrm>
             <a:off x="7277100" y="4648200"/>
-            <a:ext cx="1181100" cy="307777"/>
+            <a:ext cx="1181100" cy="338554"/>
           </a:xfrm>
           <a:prstGeom prst="rect">
             <a:avLst/>
@@ -13568,7 +13575,7 @@
           <a:p>
             <a:pPr algn="ctr"/>
             <a:r>
-              <a:rPr lang="en-US" sz="1400" dirty="0" smtClean="0">
+              <a:rPr lang="en-US" sz="1600" dirty="0" smtClean="0">
                 <a:solidFill>
                   <a:schemeClr val="bg1"/>
                 </a:solidFill>
@@ -13578,7 +13585,7 @@
               </a:rPr>
               <a:t>big speeds</a:t>
             </a:r>
-            <a:endParaRPr lang="en-US" sz="1400" dirty="0">
+            <a:endParaRPr lang="en-US" sz="1600" dirty="0">
               <a:solidFill>
                 <a:schemeClr val="bg1"/>
               </a:solidFill>
@@ -13685,7 +13692,7 @@
                 <a:tabLst/>
                 <a:defRPr/>
               </a:pPr>
-              <a:endParaRPr kumimoji="0" lang="en-US" sz="1400" b="0" i="0" u="none" strike="noStrike" kern="0" cap="none" spc="0" normalizeH="0" baseline="0" noProof="0">
+              <a:endParaRPr kumimoji="0" lang="en-US" sz="1600" b="0" i="0" u="none" strike="noStrike" kern="0" cap="none" spc="0" normalizeH="0" baseline="0" noProof="0">
                 <a:ln>
                   <a:noFill/>
                 </a:ln>
@@ -13784,7 +13791,7 @@
                 <a:tabLst/>
                 <a:defRPr/>
               </a:pPr>
-              <a:endParaRPr kumimoji="0" lang="en-US" sz="1400" b="0" i="0" u="none" strike="noStrike" kern="0" cap="none" spc="0" normalizeH="0" baseline="0" noProof="0">
+              <a:endParaRPr kumimoji="0" lang="en-US" sz="1600" b="0" i="0" u="none" strike="noStrike" kern="0" cap="none" spc="0" normalizeH="0" baseline="0" noProof="0">
                 <a:ln>
                   <a:noFill/>
                 </a:ln>
@@ -13853,7 +13860,7 @@
                 <a:tabLst/>
                 <a:defRPr/>
               </a:pPr>
-              <a:endParaRPr kumimoji="0" lang="en-US" sz="1400" b="0" i="0" u="none" strike="noStrike" kern="0" cap="none" spc="0" normalizeH="0" baseline="0" noProof="0">
+              <a:endParaRPr kumimoji="0" lang="en-US" sz="1600" b="0" i="0" u="none" strike="noStrike" kern="0" cap="none" spc="0" normalizeH="0" baseline="0" noProof="0">
                 <a:ln>
                   <a:noFill/>
                 </a:ln>
@@ -13922,7 +13929,7 @@
                 <a:tabLst/>
                 <a:defRPr/>
               </a:pPr>
-              <a:endParaRPr kumimoji="0" lang="en-US" sz="1400" b="0" i="0" u="none" strike="noStrike" kern="0" cap="none" spc="0" normalizeH="0" baseline="0" noProof="0">
+              <a:endParaRPr kumimoji="0" lang="en-US" sz="1600" b="0" i="0" u="none" strike="noStrike" kern="0" cap="none" spc="0" normalizeH="0" baseline="0" noProof="0">
                 <a:ln>
                   <a:noFill/>
                 </a:ln>
@@ -13991,7 +13998,7 @@
                 <a:tabLst/>
                 <a:defRPr/>
               </a:pPr>
-              <a:endParaRPr kumimoji="0" lang="en-US" sz="1400" b="0" i="0" u="none" strike="noStrike" kern="0" cap="none" spc="0" normalizeH="0" baseline="0" noProof="0">
+              <a:endParaRPr kumimoji="0" lang="en-US" sz="1600" b="0" i="0" u="none" strike="noStrike" kern="0" cap="none" spc="0" normalizeH="0" baseline="0" noProof="0">
                 <a:ln>
                   <a:noFill/>
                 </a:ln>
@@ -14060,7 +14067,7 @@
                 <a:tabLst/>
                 <a:defRPr/>
               </a:pPr>
-              <a:endParaRPr kumimoji="0" lang="en-US" sz="1400" b="0" i="0" u="none" strike="noStrike" kern="0" cap="none" spc="0" normalizeH="0" baseline="0" noProof="0">
+              <a:endParaRPr kumimoji="0" lang="en-US" sz="1600" b="0" i="0" u="none" strike="noStrike" kern="0" cap="none" spc="0" normalizeH="0" baseline="0" noProof="0">
                 <a:ln>
                   <a:noFill/>
                 </a:ln>
@@ -14129,7 +14136,7 @@
                 <a:tabLst/>
                 <a:defRPr/>
               </a:pPr>
-              <a:endParaRPr kumimoji="0" lang="en-US" sz="1400" b="0" i="0" u="none" strike="noStrike" kern="0" cap="none" spc="0" normalizeH="0" baseline="0" noProof="0">
+              <a:endParaRPr kumimoji="0" lang="en-US" sz="1600" b="0" i="0" u="none" strike="noStrike" kern="0" cap="none" spc="0" normalizeH="0" baseline="0" noProof="0">
                 <a:ln>
                   <a:noFill/>
                 </a:ln>
@@ -14198,7 +14205,7 @@
                 <a:tabLst/>
                 <a:defRPr/>
               </a:pPr>
-              <a:endParaRPr kumimoji="0" lang="en-US" sz="1400" b="0" i="0" u="none" strike="noStrike" kern="0" cap="none" spc="0" normalizeH="0" baseline="0" noProof="0">
+              <a:endParaRPr kumimoji="0" lang="en-US" sz="1600" b="0" i="0" u="none" strike="noStrike" kern="0" cap="none" spc="0" normalizeH="0" baseline="0" noProof="0">
                 <a:ln>
                   <a:noFill/>
                 </a:ln>
@@ -14312,7 +14319,7 @@
                 <a:tabLst/>
                 <a:defRPr/>
               </a:pPr>
-              <a:endParaRPr kumimoji="0" lang="en-US" sz="1400" b="0" i="0" u="none" strike="noStrike" kern="0" cap="none" spc="0" normalizeH="0" baseline="0" noProof="0">
+              <a:endParaRPr kumimoji="0" lang="en-US" sz="1600" b="0" i="0" u="none" strike="noStrike" kern="0" cap="none" spc="0" normalizeH="0" baseline="0" noProof="0">
                 <a:ln>
                   <a:noFill/>
                 </a:ln>
@@ -14411,7 +14418,7 @@
                 <a:tabLst/>
                 <a:defRPr/>
               </a:pPr>
-              <a:endParaRPr kumimoji="0" lang="en-US" sz="1400" b="0" i="0" u="none" strike="noStrike" kern="0" cap="none" spc="0" normalizeH="0" baseline="0" noProof="0">
+              <a:endParaRPr kumimoji="0" lang="en-US" sz="1600" b="0" i="0" u="none" strike="noStrike" kern="0" cap="none" spc="0" normalizeH="0" baseline="0" noProof="0">
                 <a:ln>
                   <a:noFill/>
                 </a:ln>
@@ -14480,7 +14487,7 @@
                 <a:tabLst/>
                 <a:defRPr/>
               </a:pPr>
-              <a:endParaRPr kumimoji="0" lang="en-US" sz="1400" b="0" i="0" u="none" strike="noStrike" kern="0" cap="none" spc="0" normalizeH="0" baseline="0" noProof="0">
+              <a:endParaRPr kumimoji="0" lang="en-US" sz="1600" b="0" i="0" u="none" strike="noStrike" kern="0" cap="none" spc="0" normalizeH="0" baseline="0" noProof="0">
                 <a:ln>
                   <a:noFill/>
                 </a:ln>
@@ -14549,7 +14556,7 @@
                 <a:tabLst/>
                 <a:defRPr/>
               </a:pPr>
-              <a:endParaRPr kumimoji="0" lang="en-US" sz="1400" b="0" i="0" u="none" strike="noStrike" kern="0" cap="none" spc="0" normalizeH="0" baseline="0" noProof="0">
+              <a:endParaRPr kumimoji="0" lang="en-US" sz="1600" b="0" i="0" u="none" strike="noStrike" kern="0" cap="none" spc="0" normalizeH="0" baseline="0" noProof="0">
                 <a:ln>
                   <a:noFill/>
                 </a:ln>
@@ -14618,7 +14625,7 @@
                 <a:tabLst/>
                 <a:defRPr/>
               </a:pPr>
-              <a:endParaRPr kumimoji="0" lang="en-US" sz="1400" b="0" i="0" u="none" strike="noStrike" kern="0" cap="none" spc="0" normalizeH="0" baseline="0" noProof="0">
+              <a:endParaRPr kumimoji="0" lang="en-US" sz="1600" b="0" i="0" u="none" strike="noStrike" kern="0" cap="none" spc="0" normalizeH="0" baseline="0" noProof="0">
                 <a:ln>
                   <a:noFill/>
                 </a:ln>
@@ -14687,7 +14694,7 @@
                 <a:tabLst/>
                 <a:defRPr/>
               </a:pPr>
-              <a:endParaRPr kumimoji="0" lang="en-US" sz="1400" b="0" i="0" u="none" strike="noStrike" kern="0" cap="none" spc="0" normalizeH="0" baseline="0" noProof="0">
+              <a:endParaRPr kumimoji="0" lang="en-US" sz="1600" b="0" i="0" u="none" strike="noStrike" kern="0" cap="none" spc="0" normalizeH="0" baseline="0" noProof="0">
                 <a:ln>
                   <a:noFill/>
                 </a:ln>
@@ -14756,7 +14763,7 @@
                 <a:tabLst/>
                 <a:defRPr/>
               </a:pPr>
-              <a:endParaRPr kumimoji="0" lang="en-US" sz="1400" b="0" i="0" u="none" strike="noStrike" kern="0" cap="none" spc="0" normalizeH="0" baseline="0" noProof="0">
+              <a:endParaRPr kumimoji="0" lang="en-US" sz="1600" b="0" i="0" u="none" strike="noStrike" kern="0" cap="none" spc="0" normalizeH="0" baseline="0" noProof="0">
                 <a:ln>
                   <a:noFill/>
                 </a:ln>
@@ -14825,7 +14832,7 @@
                 <a:tabLst/>
                 <a:defRPr/>
               </a:pPr>
-              <a:endParaRPr kumimoji="0" lang="en-US" sz="1400" b="0" i="0" u="none" strike="noStrike" kern="0" cap="none" spc="0" normalizeH="0" baseline="0" noProof="0">
+              <a:endParaRPr kumimoji="0" lang="en-US" sz="1600" b="0" i="0" u="none" strike="noStrike" kern="0" cap="none" spc="0" normalizeH="0" baseline="0" noProof="0">
                 <a:ln>
                   <a:noFill/>
                 </a:ln>
@@ -14851,8 +14858,8 @@
         </p:nvSpPr>
         <p:spPr>
           <a:xfrm>
-            <a:off x="6248400" y="5715000"/>
-            <a:ext cx="1181100" cy="523220"/>
+            <a:off x="6286500" y="5715000"/>
+            <a:ext cx="1181100" cy="584775"/>
           </a:xfrm>
           <a:prstGeom prst="rect">
             <a:avLst/>
@@ -14867,7 +14874,7 @@
           <a:p>
             <a:pPr algn="ctr"/>
             <a:r>
-              <a:rPr lang="en-US" sz="1400" dirty="0" smtClean="0">
+              <a:rPr lang="en-US" sz="1600" dirty="0" smtClean="0">
                 <a:solidFill>
                   <a:schemeClr val="bg1"/>
                 </a:solidFill>
@@ -14877,7 +14884,7 @@
               </a:rPr>
               <a:t>LITTLE cores</a:t>
             </a:r>
-            <a:endParaRPr lang="en-US" sz="1400" dirty="0">
+            <a:endParaRPr lang="en-US" sz="1600" dirty="0">
               <a:solidFill>
                 <a:schemeClr val="bg1"/>
               </a:solidFill>
@@ -14897,7 +14904,7 @@
         <p:spPr>
           <a:xfrm>
             <a:off x="7277100" y="5715000"/>
-            <a:ext cx="1257300" cy="523220"/>
+            <a:ext cx="1257300" cy="584775"/>
           </a:xfrm>
           <a:prstGeom prst="rect">
             <a:avLst/>
@@ -14912,7 +14919,7 @@
           <a:p>
             <a:pPr algn="ctr"/>
             <a:r>
-              <a:rPr lang="en-US" sz="1400" dirty="0" smtClean="0">
+              <a:rPr lang="en-US" sz="1600" dirty="0" smtClean="0">
                 <a:solidFill>
                   <a:schemeClr val="bg1"/>
                 </a:solidFill>
@@ -14922,7 +14929,7 @@
               </a:rPr>
               <a:t>LITTLE speeds</a:t>
             </a:r>
-            <a:endParaRPr lang="en-US" sz="1400" dirty="0">
+            <a:endParaRPr lang="en-US" sz="1600" dirty="0">
               <a:solidFill>
                 <a:schemeClr val="bg1"/>
               </a:solidFill>
@@ -14947,6 +14954,9 @@
           <a:prstGeom prst="rect">
             <a:avLst/>
           </a:prstGeom>
+          <a:ln>
+            <a:noFill/>
+          </a:ln>
         </p:spPr>
         <p:style>
           <a:lnRef idx="2">
@@ -14970,14 +14980,14 @@
           <a:p>
             <a:pPr algn="ctr"/>
             <a:r>
-              <a:rPr lang="en-US" dirty="0" smtClean="0">
+              <a:rPr lang="en-US" sz="2000" dirty="0" smtClean="0">
                 <a:latin typeface="Times" charset="0"/>
                 <a:ea typeface="Times" charset="0"/>
                 <a:cs typeface="Times" charset="0"/>
               </a:rPr>
               <a:t>Application</a:t>
             </a:r>
-            <a:endParaRPr lang="en-US" dirty="0">
+            <a:endParaRPr lang="en-US" sz="2000" dirty="0">
               <a:latin typeface="Times" charset="0"/>
               <a:ea typeface="Times" charset="0"/>
               <a:cs typeface="Times" charset="0"/>
@@ -14988,16 +14998,13 @@
       <p:cxnSp>
         <p:nvCxnSpPr>
           <p:cNvPr id="49" name="Straight Arrow Connector 48"/>
-          <p:cNvCxnSpPr>
-            <a:stCxn id="2" idx="3"/>
-            <a:endCxn id="63" idx="1"/>
-          </p:cNvCxnSpPr>
+          <p:cNvCxnSpPr/>
           <p:nvPr/>
         </p:nvCxnSpPr>
         <p:spPr>
           <a:xfrm>
-            <a:off x="3962400" y="5211679"/>
-            <a:ext cx="533400" cy="1"/>
+            <a:off x="3810163" y="5211679"/>
+            <a:ext cx="533237" cy="1"/>
           </a:xfrm>
           <a:prstGeom prst="straightConnector1">
             <a:avLst/>
@@ -15005,6 +15012,7 @@
           <a:ln>
             <a:tailEnd type="arrow"/>
           </a:ln>
+          <a:effectLst/>
         </p:spPr>
         <p:style>
           <a:lnRef idx="3">
@@ -15035,6 +15043,9 @@
           <a:prstGeom prst="ellipse">
             <a:avLst/>
           </a:prstGeom>
+          <a:ln>
+            <a:noFill/>
+          </a:ln>
         </p:spPr>
         <p:style>
           <a:lnRef idx="2">
@@ -15058,14 +15069,14 @@
           <a:p>
             <a:pPr algn="ctr"/>
             <a:r>
-              <a:rPr lang="en-US" sz="5400" dirty="0" smtClean="0">
+              <a:rPr lang="en-US" sz="6000" dirty="0" smtClean="0">
                 <a:latin typeface="Times" charset="0"/>
                 <a:ea typeface="Times" charset="0"/>
                 <a:cs typeface="Times" charset="0"/>
               </a:rPr>
               <a:t>-</a:t>
             </a:r>
-            <a:endParaRPr lang="en-US" sz="5400" dirty="0">
+            <a:endParaRPr lang="en-US" sz="6000" dirty="0">
               <a:latin typeface="Times" charset="0"/>
               <a:ea typeface="Times" charset="0"/>
               <a:cs typeface="Times" charset="0"/>
@@ -15093,6 +15104,7 @@
           <a:ln>
             <a:tailEnd type="arrow"/>
           </a:ln>
+          <a:effectLst/>
         </p:spPr>
         <p:style>
           <a:lnRef idx="3">
@@ -15118,7 +15130,7 @@
         <p:spPr>
           <a:xfrm>
             <a:off x="2843880" y="6030014"/>
-            <a:ext cx="3429000" cy="369332"/>
+            <a:ext cx="3429000" cy="400110"/>
           </a:xfrm>
           <a:prstGeom prst="rect">
             <a:avLst/>
@@ -15133,14 +15145,14 @@
           <a:p>
             <a:pPr algn="ctr"/>
             <a:r>
-              <a:rPr lang="en-US" i="1" dirty="0" smtClean="0">
+              <a:rPr lang="en-US" sz="2000" i="1" dirty="0" smtClean="0">
                 <a:latin typeface="Times" charset="0"/>
                 <a:ea typeface="Times" charset="0"/>
                 <a:cs typeface="Times" charset="0"/>
               </a:rPr>
               <a:t>Performance Feedback</a:t>
             </a:r>
-            <a:endParaRPr lang="en-US" i="1" dirty="0">
+            <a:endParaRPr lang="en-US" sz="2000" i="1" dirty="0">
               <a:latin typeface="Times" charset="0"/>
               <a:ea typeface="Times" charset="0"/>
               <a:cs typeface="Times" charset="0"/>
@@ -15167,6 +15179,7 @@
           <a:ln>
             <a:tailEnd type="arrow"/>
           </a:ln>
+          <a:effectLst/>
         </p:spPr>
         <p:style>
           <a:lnRef idx="3">
@@ -15192,7 +15205,7 @@
         <p:spPr>
           <a:xfrm>
             <a:off x="-56098" y="4427271"/>
-            <a:ext cx="1828800" cy="646331"/>
+            <a:ext cx="1828800" cy="707886"/>
           </a:xfrm>
           <a:prstGeom prst="rect">
             <a:avLst/>
@@ -15207,7 +15220,7 @@
           <a:p>
             <a:pPr algn="ctr"/>
             <a:r>
-              <a:rPr lang="en-US" i="1" dirty="0" smtClean="0">
+              <a:rPr lang="en-US" sz="2000" i="1" dirty="0" smtClean="0">
                 <a:latin typeface="Times" charset="0"/>
                 <a:ea typeface="Times" charset="0"/>
                 <a:cs typeface="Times" charset="0"/>
@@ -15218,14 +15231,14 @@
           <a:p>
             <a:pPr algn="ctr"/>
             <a:r>
-              <a:rPr lang="en-US" i="1" dirty="0" smtClean="0">
+              <a:rPr lang="en-US" sz="2000" i="1" dirty="0" smtClean="0">
                 <a:latin typeface="Times" charset="0"/>
                 <a:ea typeface="Times" charset="0"/>
                 <a:cs typeface="Times" charset="0"/>
               </a:rPr>
               <a:t>Requirement</a:t>
             </a:r>
-            <a:endParaRPr lang="en-US" i="1" dirty="0">
+            <a:endParaRPr lang="en-US" sz="2000" i="1" dirty="0">
               <a:latin typeface="Times" charset="0"/>
               <a:ea typeface="Times" charset="0"/>
               <a:cs typeface="Times" charset="0"/>
@@ -15241,8 +15254,8 @@
         </p:nvSpPr>
         <p:spPr>
           <a:xfrm>
-            <a:off x="4495800" y="4724400"/>
-            <a:ext cx="1365678" cy="974559"/>
+            <a:off x="4346198" y="4724400"/>
+            <a:ext cx="1515280" cy="974559"/>
           </a:xfrm>
           <a:prstGeom prst="rect">
             <a:avLst/>
@@ -15250,6 +15263,9 @@
           <a:solidFill>
             <a:schemeClr val="accent1"/>
           </a:solidFill>
+          <a:ln>
+            <a:noFill/>
+          </a:ln>
         </p:spPr>
         <p:style>
           <a:lnRef idx="1">
@@ -15271,7 +15287,7 @@
           <a:p>
             <a:pPr algn="ctr"/>
             <a:r>
-              <a:rPr lang="en-US" dirty="0" smtClean="0">
+              <a:rPr lang="en-US" sz="2000" dirty="0" smtClean="0">
                 <a:solidFill>
                   <a:schemeClr val="bg1"/>
                 </a:solidFill>
@@ -15285,7 +15301,7 @@
           <a:p>
             <a:pPr algn="ctr"/>
             <a:r>
-              <a:rPr lang="en-US" dirty="0" smtClean="0">
+              <a:rPr lang="en-US" sz="2000" dirty="0" smtClean="0">
                 <a:solidFill>
                   <a:schemeClr val="bg1"/>
                 </a:solidFill>
@@ -15317,6 +15333,7 @@
           <a:ln>
             <a:tailEnd type="arrow"/>
           </a:ln>
+          <a:effectLst/>
         </p:spPr>
         <p:style>
           <a:lnRef idx="3">
@@ -15341,42 +15358,44 @@
         </p:nvSpPr>
         <p:spPr>
           <a:xfrm>
-            <a:off x="2895600" y="1981200"/>
-            <a:ext cx="1885330" cy="646331"/>
+            <a:off x="2743200" y="1905000"/>
+            <a:ext cx="1885330" cy="707886"/>
           </a:xfrm>
           <a:prstGeom prst="rect">
             <a:avLst/>
           </a:prstGeom>
-          <a:gradFill>
+          <a:gradFill flip="none" rotWithShape="1">
             <a:gsLst>
               <a:gs pos="0">
                 <a:schemeClr val="accent1">
-                  <a:tint val="50000"/>
-                  <a:satMod val="300000"/>
+                  <a:lumMod val="5000"/>
+                  <a:lumOff val="95000"/>
                 </a:schemeClr>
               </a:gs>
-              <a:gs pos="35000">
+              <a:gs pos="0">
                 <a:schemeClr val="accent1">
-                  <a:tint val="37000"/>
-                  <a:satMod val="300000"/>
+                  <a:lumMod val="45000"/>
+                  <a:lumOff val="55000"/>
+                </a:schemeClr>
+              </a:gs>
+              <a:gs pos="55000">
+                <a:schemeClr val="accent1">
+                  <a:lumMod val="45000"/>
+                  <a:lumOff val="55000"/>
                 </a:schemeClr>
               </a:gs>
               <a:gs pos="100000">
                 <a:schemeClr val="accent1">
-                  <a:tint val="15000"/>
-                  <a:satMod val="350000"/>
+                  <a:lumMod val="30000"/>
+                  <a:lumOff val="70000"/>
                 </a:schemeClr>
               </a:gs>
             </a:gsLst>
-            <a:lin ang="16200000" scaled="1"/>
+            <a:lin ang="5400000" scaled="1"/>
+            <a:tileRect/>
           </a:gradFill>
           <a:ln>
-            <a:solidFill>
-              <a:schemeClr val="accent1">
-                <a:shade val="95000"/>
-                <a:satMod val="105000"/>
-              </a:schemeClr>
-            </a:solidFill>
+            <a:noFill/>
           </a:ln>
         </p:spPr>
         <p:txBody>
@@ -15387,7 +15406,7 @@
           <a:p>
             <a:pPr algn="ctr"/>
             <a:r>
-              <a:rPr lang="en-US" dirty="0" smtClean="0">
+              <a:rPr lang="en-US" sz="2000" dirty="0" smtClean="0">
                 <a:latin typeface="Times" charset="0"/>
                 <a:ea typeface="Times" charset="0"/>
                 <a:cs typeface="Times" charset="0"/>
@@ -15398,7 +15417,7 @@
           <a:p>
             <a:pPr algn="ctr"/>
             <a:r>
-              <a:rPr lang="en-US" dirty="0" smtClean="0">
+              <a:rPr lang="en-US" sz="2000" dirty="0" smtClean="0">
                 <a:latin typeface="Times" charset="0"/>
                 <a:ea typeface="Times" charset="0"/>
                 <a:cs typeface="Times" charset="0"/>
@@ -15406,7 +15425,7 @@
               <a:t>Hash</a:t>
             </a:r>
             <a:r>
-              <a:rPr lang="en-US" dirty="0">
+              <a:rPr lang="en-US" sz="2000" dirty="0">
                 <a:latin typeface="Times" charset="0"/>
                 <a:ea typeface="Times" charset="0"/>
                 <a:cs typeface="Times" charset="0"/>
@@ -15414,14 +15433,14 @@
               <a:t> </a:t>
             </a:r>
             <a:r>
-              <a:rPr lang="en-US" dirty="0" smtClean="0">
+              <a:rPr lang="en-US" sz="2000" dirty="0" smtClean="0">
                 <a:latin typeface="Times" charset="0"/>
                 <a:ea typeface="Times" charset="0"/>
                 <a:cs typeface="Times" charset="0"/>
               </a:rPr>
               <a:t>Table</a:t>
             </a:r>
-            <a:endParaRPr lang="en-US" dirty="0" smtClean="0">
+            <a:endParaRPr lang="en-US" sz="2000" dirty="0" smtClean="0">
               <a:latin typeface="Times" charset="0"/>
               <a:ea typeface="Times" charset="0"/>
               <a:cs typeface="Times" charset="0"/>
@@ -15448,6 +15467,7 @@
           <a:ln>
             <a:tailEnd type="arrow"/>
           </a:ln>
+          <a:effectLst/>
         </p:spPr>
         <p:style>
           <a:lnRef idx="3">
@@ -15475,7 +15495,7 @@
         <p:spPr>
           <a:xfrm>
             <a:off x="2643148" y="2701964"/>
-            <a:ext cx="2535491" cy="2022436"/>
+            <a:ext cx="2460690" cy="2022436"/>
           </a:xfrm>
           <a:prstGeom prst="bentConnector2">
             <a:avLst/>
@@ -15483,6 +15503,7 @@
           <a:ln>
             <a:tailEnd type="arrow"/>
           </a:ln>
+          <a:effectLst/>
         </p:spPr>
         <p:style>
           <a:lnRef idx="3">
@@ -15508,7 +15529,7 @@
         <p:spPr>
           <a:xfrm>
             <a:off x="89636" y="3350319"/>
-            <a:ext cx="3186964" cy="646331"/>
+            <a:ext cx="4406164" cy="707886"/>
           </a:xfrm>
           <a:prstGeom prst="rect">
             <a:avLst/>
@@ -15529,28 +15550,20 @@
           <a:p>
             <a:pPr algn="ctr"/>
             <a:r>
-              <a:rPr lang="en-US" b="1" dirty="0" smtClean="0">
+              <a:rPr lang="en-US" sz="2000" b="1" dirty="0" smtClean="0">
                 <a:latin typeface="Times" charset="0"/>
                 <a:ea typeface="Times" charset="0"/>
                 <a:cs typeface="Times" charset="0"/>
               </a:rPr>
-              <a:t>Mobile </a:t>
+              <a:t>Embedded/Mobile Device: Running Generalized </a:t>
             </a:r>
             <a:r>
-              <a:rPr lang="en-US" b="1" dirty="0" smtClean="0">
+              <a:rPr lang="en-US" sz="2000" b="1" dirty="0" smtClean="0">
                 <a:latin typeface="Times" charset="0"/>
                 <a:ea typeface="Times" charset="0"/>
                 <a:cs typeface="Times" charset="0"/>
               </a:rPr>
-              <a:t>Device: Running </a:t>
-            </a:r>
-            <a:r>
-              <a:rPr lang="en-US" b="1" dirty="0" smtClean="0">
-                <a:latin typeface="Times" charset="0"/>
-                <a:ea typeface="Times" charset="0"/>
-                <a:cs typeface="Times" charset="0"/>
-              </a:rPr>
-              <a:t>Lightweight Control System</a:t>
+              <a:t>Control System</a:t>
             </a:r>
           </a:p>
         </p:txBody>
@@ -15639,7 +15652,7 @@
             <a:lstStyle/>
             <a:p>
               <a:pPr algn="ctr"/>
-              <a:endParaRPr lang="en-US">
+              <a:endParaRPr lang="en-US" sz="2000">
                 <a:latin typeface="Times" charset="0"/>
                 <a:ea typeface="Times" charset="0"/>
                 <a:cs typeface="Times" charset="0"/>
@@ -15720,9 +15733,9 @@
           <p:grpSpPr>
             <a:xfrm>
               <a:off x="511215" y="685800"/>
-              <a:ext cx="2460585" cy="2548549"/>
+              <a:ext cx="2460585" cy="2579326"/>
               <a:chOff x="572512" y="575651"/>
-              <a:chExt cx="2460585" cy="2548549"/>
+              <a:chExt cx="2460585" cy="2579326"/>
             </a:xfrm>
           </p:grpSpPr>
           <p:grpSp>
@@ -15734,9 +15747,9 @@
             <p:grpSpPr>
               <a:xfrm>
                 <a:off x="572512" y="575651"/>
-                <a:ext cx="2460585" cy="2548549"/>
+                <a:ext cx="2460585" cy="2579326"/>
                 <a:chOff x="952500" y="3080723"/>
-                <a:chExt cx="2460585" cy="2548549"/>
+                <a:chExt cx="2460585" cy="2579326"/>
               </a:xfrm>
             </p:grpSpPr>
             <p:grpSp>
@@ -15748,9 +15761,9 @@
               <p:grpSpPr>
                 <a:xfrm>
                   <a:off x="952500" y="3080723"/>
-                  <a:ext cx="1751635" cy="2548549"/>
+                  <a:ext cx="1751635" cy="2579326"/>
                   <a:chOff x="952500" y="3080723"/>
-                  <a:chExt cx="1751635" cy="2548549"/>
+                  <a:chExt cx="1751635" cy="2579326"/>
                 </a:xfrm>
               </p:grpSpPr>
               <p:grpSp>
@@ -15762,9 +15775,9 @@
                 <p:grpSpPr>
                   <a:xfrm>
                     <a:off x="952500" y="3080723"/>
-                    <a:ext cx="1751635" cy="2548549"/>
+                    <a:ext cx="1751635" cy="2579326"/>
                     <a:chOff x="952500" y="3080723"/>
-                    <a:chExt cx="1751635" cy="2548549"/>
+                    <a:chExt cx="1751635" cy="2579326"/>
                   </a:xfrm>
                 </p:grpSpPr>
                 <p:cxnSp>
@@ -15784,6 +15797,7 @@
                     <a:ln>
                       <a:tailEnd type="arrow"/>
                     </a:ln>
+                    <a:effectLst/>
                   </p:spPr>
                   <p:style>
                     <a:lnRef idx="3">
@@ -15809,7 +15823,7 @@
                   <p:spPr>
                     <a:xfrm>
                       <a:off x="1637335" y="3080723"/>
-                      <a:ext cx="1066800" cy="307777"/>
+                      <a:ext cx="1066800" cy="338554"/>
                     </a:xfrm>
                     <a:prstGeom prst="rect">
                       <a:avLst/>
@@ -15824,14 +15838,14 @@
                     <a:p>
                       <a:pPr algn="ctr"/>
                       <a:r>
-                        <a:rPr lang="en-US" sz="1400" dirty="0" smtClean="0">
+                        <a:rPr lang="en-US" sz="1600" dirty="0" smtClean="0">
                           <a:latin typeface="Times" charset="0"/>
                           <a:ea typeface="Times" charset="0"/>
                           <a:cs typeface="Times" charset="0"/>
                         </a:rPr>
                         <a:t>Model</a:t>
                       </a:r>
-                      <a:endParaRPr lang="en-US" sz="1400" dirty="0">
+                      <a:endParaRPr lang="en-US" sz="1600" dirty="0">
                         <a:latin typeface="Times" charset="0"/>
                         <a:ea typeface="Times" charset="0"/>
                         <a:cs typeface="Times" charset="0"/>
@@ -15848,7 +15862,7 @@
                   <p:spPr>
                     <a:xfrm>
                       <a:off x="952500" y="5321495"/>
-                      <a:ext cx="918018" cy="307777"/>
+                      <a:ext cx="918018" cy="338554"/>
                     </a:xfrm>
                     <a:prstGeom prst="rect">
                       <a:avLst/>
@@ -15863,14 +15877,14 @@
                     <a:p>
                       <a:pPr algn="ctr"/>
                       <a:r>
-                        <a:rPr lang="en-US" sz="1400" dirty="0" smtClean="0">
+                        <a:rPr lang="en-US" sz="1600" dirty="0" smtClean="0">
                           <a:latin typeface="Times" charset="0"/>
                           <a:ea typeface="Times" charset="0"/>
                           <a:cs typeface="Times" charset="0"/>
                         </a:rPr>
                         <a:t>App 1</a:t>
                       </a:r>
-                      <a:endParaRPr lang="en-US" sz="1400" dirty="0">
+                      <a:endParaRPr lang="en-US" sz="1600" dirty="0">
                         <a:latin typeface="Times" charset="0"/>
                         <a:ea typeface="Times" charset="0"/>
                         <a:cs typeface="Times" charset="0"/>
@@ -15914,7 +15928,7 @@
                   <a:lstStyle/>
                   <a:p>
                     <a:pPr algn="ctr"/>
-                    <a:endParaRPr lang="en-US" sz="1400">
+                    <a:endParaRPr lang="en-US" sz="1600">
                       <a:latin typeface="Times" charset="0"/>
                       <a:ea typeface="Times" charset="0"/>
                       <a:cs typeface="Times" charset="0"/>
@@ -15932,9 +15946,9 @@
               <p:grpSpPr>
                 <a:xfrm>
                   <a:off x="1705170" y="3344346"/>
-                  <a:ext cx="918018" cy="2284926"/>
+                  <a:ext cx="918018" cy="2315703"/>
                   <a:chOff x="952500" y="3344346"/>
-                  <a:chExt cx="918018" cy="2284926"/>
+                  <a:chExt cx="918018" cy="2315703"/>
                 </a:xfrm>
               </p:grpSpPr>
               <p:grpSp>
@@ -15946,9 +15960,9 @@
                 <p:grpSpPr>
                   <a:xfrm>
                     <a:off x="952500" y="3344346"/>
-                    <a:ext cx="918018" cy="2284926"/>
+                    <a:ext cx="918018" cy="2315703"/>
                     <a:chOff x="952500" y="3344346"/>
-                    <a:chExt cx="918018" cy="2284926"/>
+                    <a:chExt cx="918018" cy="2315703"/>
                   </a:xfrm>
                 </p:grpSpPr>
                 <p:sp>
@@ -15986,7 +16000,7 @@
                     <a:lstStyle/>
                     <a:p>
                       <a:pPr algn="ctr"/>
-                      <a:endParaRPr lang="en-US" sz="1400">
+                      <a:endParaRPr lang="en-US" sz="1600">
                         <a:latin typeface="Times" charset="0"/>
                         <a:ea typeface="Times" charset="0"/>
                         <a:cs typeface="Times" charset="0"/>
@@ -16011,6 +16025,7 @@
                     <a:ln>
                       <a:tailEnd type="arrow"/>
                     </a:ln>
+                    <a:effectLst/>
                   </p:spPr>
                   <p:style>
                     <a:lnRef idx="3">
@@ -16036,7 +16051,7 @@
                   <p:spPr>
                     <a:xfrm>
                       <a:off x="952500" y="5321495"/>
-                      <a:ext cx="918018" cy="307777"/>
+                      <a:ext cx="918018" cy="338554"/>
                     </a:xfrm>
                     <a:prstGeom prst="rect">
                       <a:avLst/>
@@ -16051,14 +16066,14 @@
                     <a:p>
                       <a:pPr algn="ctr"/>
                       <a:r>
-                        <a:rPr lang="en-US" sz="1400" dirty="0" smtClean="0">
+                        <a:rPr lang="en-US" sz="1600" dirty="0" smtClean="0">
                           <a:latin typeface="Times" charset="0"/>
                           <a:ea typeface="Times" charset="0"/>
                           <a:cs typeface="Times" charset="0"/>
                         </a:rPr>
                         <a:t>App 2</a:t>
                       </a:r>
-                      <a:endParaRPr lang="en-US" sz="1400" dirty="0">
+                      <a:endParaRPr lang="en-US" sz="1600" dirty="0">
                         <a:latin typeface="Times" charset="0"/>
                         <a:ea typeface="Times" charset="0"/>
                         <a:cs typeface="Times" charset="0"/>
@@ -16102,7 +16117,7 @@
                   <a:lstStyle/>
                   <a:p>
                     <a:pPr algn="ctr"/>
-                    <a:endParaRPr lang="en-US" sz="1400">
+                    <a:endParaRPr lang="en-US" sz="1600">
                       <a:latin typeface="Times" charset="0"/>
                       <a:ea typeface="Times" charset="0"/>
                       <a:cs typeface="Times" charset="0"/>
@@ -16120,9 +16135,9 @@
               <p:grpSpPr>
                 <a:xfrm>
                   <a:off x="2314770" y="3496746"/>
-                  <a:ext cx="1098315" cy="2132526"/>
+                  <a:ext cx="1098315" cy="2163303"/>
                   <a:chOff x="563135" y="3496746"/>
-                  <a:chExt cx="1098315" cy="2132526"/>
+                  <a:chExt cx="1098315" cy="2163303"/>
                 </a:xfrm>
               </p:grpSpPr>
               <p:grpSp>
@@ -16134,9 +16149,9 @@
                 <p:grpSpPr>
                   <a:xfrm>
                     <a:off x="563135" y="3496746"/>
-                    <a:ext cx="1098315" cy="2132526"/>
+                    <a:ext cx="1098315" cy="2163303"/>
                     <a:chOff x="563135" y="3496746"/>
-                    <a:chExt cx="1098315" cy="2132526"/>
+                    <a:chExt cx="1098315" cy="2163303"/>
                   </a:xfrm>
                 </p:grpSpPr>
                 <p:cxnSp>
@@ -16156,6 +16171,7 @@
                     <a:ln>
                       <a:tailEnd type="arrow"/>
                     </a:ln>
+                    <a:effectLst/>
                   </p:spPr>
                   <p:style>
                     <a:lnRef idx="3">
@@ -16181,7 +16197,7 @@
                   <p:spPr>
                     <a:xfrm>
                       <a:off x="743432" y="5321495"/>
-                      <a:ext cx="918018" cy="307777"/>
+                      <a:ext cx="918018" cy="338554"/>
                     </a:xfrm>
                     <a:prstGeom prst="rect">
                       <a:avLst/>
@@ -16196,14 +16212,14 @@
                     <a:p>
                       <a:pPr algn="ctr"/>
                       <a:r>
-                        <a:rPr lang="en-US" sz="1400" dirty="0" smtClean="0">
+                        <a:rPr lang="en-US" sz="1600" dirty="0" smtClean="0">
                           <a:latin typeface="Times" charset="0"/>
                           <a:ea typeface="Times" charset="0"/>
                           <a:cs typeface="Times" charset="0"/>
                         </a:rPr>
                         <a:t>App N</a:t>
                       </a:r>
-                      <a:endParaRPr lang="en-US" sz="1400" dirty="0">
+                      <a:endParaRPr lang="en-US" sz="1600" dirty="0">
                         <a:latin typeface="Times" charset="0"/>
                         <a:ea typeface="Times" charset="0"/>
                         <a:cs typeface="Times" charset="0"/>
@@ -16247,7 +16263,7 @@
                   <a:lstStyle/>
                   <a:p>
                     <a:pPr algn="ctr"/>
-                    <a:endParaRPr lang="en-US" sz="1400">
+                    <a:endParaRPr lang="en-US" sz="1600">
                       <a:latin typeface="Times" charset="0"/>
                       <a:ea typeface="Times" charset="0"/>
                       <a:cs typeface="Times" charset="0"/>
@@ -16264,8 +16280,8 @@
               </p:nvSpPr>
               <p:spPr>
                 <a:xfrm>
-                  <a:off x="2255289" y="4197385"/>
-                  <a:ext cx="533400" cy="707886"/>
+                  <a:off x="2172608" y="4152005"/>
+                  <a:ext cx="533400" cy="769441"/>
                 </a:xfrm>
                 <a:prstGeom prst="rect">
                   <a:avLst/>
@@ -16279,14 +16295,14 @@
                 <a:lstStyle/>
                 <a:p>
                   <a:r>
-                    <a:rPr lang="en-US" sz="4000" dirty="0" smtClean="0">
+                    <a:rPr lang="en-US" sz="4400" dirty="0" smtClean="0">
                       <a:latin typeface="Times" charset="0"/>
                       <a:ea typeface="Times" charset="0"/>
                       <a:cs typeface="Times" charset="0"/>
                     </a:rPr>
                     <a:t>…</a:t>
                   </a:r>
-                  <a:endParaRPr lang="en-US" sz="4000" dirty="0">
+                  <a:endParaRPr lang="en-US" sz="4400" dirty="0">
                     <a:latin typeface="Times" charset="0"/>
                     <a:ea typeface="Times" charset="0"/>
                     <a:cs typeface="Times" charset="0"/>
@@ -16332,7 +16348,7 @@
               <a:lstStyle/>
               <a:p>
                 <a:pPr algn="ctr"/>
-                <a:endParaRPr lang="en-US" sz="1400">
+                <a:endParaRPr lang="en-US" sz="1600">
                   <a:latin typeface="Times" charset="0"/>
                   <a:ea typeface="Times" charset="0"/>
                   <a:cs typeface="Times" charset="0"/>
@@ -16377,7 +16393,7 @@
               <a:lstStyle/>
               <a:p>
                 <a:pPr algn="ctr"/>
-                <a:endParaRPr lang="en-US" sz="1400">
+                <a:endParaRPr lang="en-US" sz="1600">
                   <a:latin typeface="Times" charset="0"/>
                   <a:ea typeface="Times" charset="0"/>
                   <a:cs typeface="Times" charset="0"/>
@@ -16393,7 +16409,7 @@
             </p:nvSpPr>
             <p:spPr>
               <a:xfrm>
-                <a:off x="2426715" y="2549724"/>
+                <a:off x="2426715" y="2556851"/>
                 <a:ext cx="304800" cy="304799"/>
               </a:xfrm>
               <a:prstGeom prst="ellipse">
@@ -16425,7 +16441,7 @@
               <a:lstStyle/>
               <a:p>
                 <a:pPr algn="ctr"/>
-                <a:endParaRPr lang="en-US" sz="1400">
+                <a:endParaRPr lang="en-US" sz="1600">
                   <a:latin typeface="Times" charset="0"/>
                   <a:ea typeface="Times" charset="0"/>
                   <a:cs typeface="Times" charset="0"/>
@@ -16453,6 +16469,7 @@
               <a:ln>
                 <a:tailEnd type="arrow"/>
               </a:ln>
+              <a:effectLst/>
             </p:spPr>
             <p:style>
               <a:lnRef idx="3">
@@ -16477,7 +16494,7 @@
             </p:nvCxnSpPr>
             <p:spPr>
               <a:xfrm flipH="1">
-                <a:off x="1764332" y="2006800"/>
+                <a:off x="1764332" y="2032977"/>
                 <a:ext cx="5566" cy="523874"/>
               </a:xfrm>
               <a:prstGeom prst="straightConnector1">
@@ -16486,6 +16503,7 @@
               <a:ln>
                 <a:tailEnd type="arrow"/>
               </a:ln>
+              <a:effectLst/>
             </p:spPr>
             <p:style>
               <a:lnRef idx="3">
@@ -16510,7 +16528,7 @@
             </p:nvCxnSpPr>
             <p:spPr>
               <a:xfrm flipH="1">
-                <a:off x="2569496" y="2009928"/>
+                <a:off x="2569496" y="2032977"/>
                 <a:ext cx="5566" cy="523874"/>
               </a:xfrm>
               <a:prstGeom prst="straightConnector1">
@@ -16519,6 +16537,7 @@
               <a:ln>
                 <a:tailEnd type="arrow"/>
               </a:ln>
+              <a:effectLst/>
             </p:spPr>
             <p:style>
               <a:lnRef idx="3">
@@ -16545,8 +16564,8 @@
         </p:nvSpPr>
         <p:spPr>
           <a:xfrm>
-            <a:off x="3390900" y="921264"/>
-            <a:ext cx="3429000" cy="369332"/>
+            <a:off x="3352800" y="921264"/>
+            <a:ext cx="3429000" cy="400110"/>
           </a:xfrm>
           <a:prstGeom prst="rect">
             <a:avLst/>
@@ -16561,14 +16580,14 @@
           <a:p>
             <a:pPr algn="ctr"/>
             <a:r>
-              <a:rPr lang="en-US" i="1" smtClean="0">
+              <a:rPr lang="en-US" sz="2000" i="1" smtClean="0">
                 <a:latin typeface="Times" charset="0"/>
                 <a:ea typeface="Times" charset="0"/>
                 <a:cs typeface="Times" charset="0"/>
               </a:rPr>
               <a:t>Performance/Power Samples</a:t>
             </a:r>
-            <a:endParaRPr lang="en-US" i="1" dirty="0">
+            <a:endParaRPr lang="en-US" sz="2000" i="1" dirty="0">
               <a:latin typeface="Times" charset="0"/>
               <a:ea typeface="Times" charset="0"/>
               <a:cs typeface="Times" charset="0"/>
@@ -16576,6 +16595,82 @@
           </a:p>
         </p:txBody>
       </p:sp>
+      <p:sp>
+        <p:nvSpPr>
+          <p:cNvPr id="203" name="TextBox 202"/>
+          <p:cNvSpPr txBox="1"/>
+          <p:nvPr/>
+        </p:nvSpPr>
+        <p:spPr>
+          <a:xfrm>
+            <a:off x="3886200" y="2147533"/>
+            <a:ext cx="3429000" cy="400110"/>
+          </a:xfrm>
+          <a:prstGeom prst="rect">
+            <a:avLst/>
+          </a:prstGeom>
+          <a:noFill/>
+        </p:spPr>
+        <p:txBody>
+          <a:bodyPr wrap="square" rtlCol="0">
+            <a:spAutoFit/>
+          </a:bodyPr>
+          <a:lstStyle/>
+          <a:p>
+            <a:pPr algn="ctr"/>
+            <a:r>
+              <a:rPr lang="en-US" sz="2000" i="1" dirty="0" smtClean="0">
+                <a:latin typeface="Times" charset="0"/>
+                <a:ea typeface="Times" charset="0"/>
+                <a:cs typeface="Times" charset="0"/>
+              </a:rPr>
+              <a:t>+ Model Variance</a:t>
+            </a:r>
+            <a:endParaRPr lang="en-US" sz="2000" i="1" dirty="0">
+              <a:latin typeface="Times" charset="0"/>
+              <a:ea typeface="Times" charset="0"/>
+              <a:cs typeface="Times" charset="0"/>
+            </a:endParaRPr>
+          </a:p>
+        </p:txBody>
+      </p:sp>
+      <p:cxnSp>
+        <p:nvCxnSpPr>
+          <p:cNvPr id="205" name="Straight Connector 204"/>
+          <p:cNvCxnSpPr/>
+          <p:nvPr/>
+        </p:nvCxnSpPr>
+        <p:spPr>
+          <a:xfrm>
+            <a:off x="6335458" y="3886199"/>
+            <a:ext cx="2160842" cy="0"/>
+          </a:xfrm>
+          <a:prstGeom prst="line">
+            <a:avLst/>
+          </a:prstGeom>
+          <a:ln>
+            <a:solidFill>
+              <a:schemeClr val="accent1">
+                <a:lumMod val="50000"/>
+              </a:schemeClr>
+            </a:solidFill>
+          </a:ln>
+        </p:spPr>
+        <p:style>
+          <a:lnRef idx="1">
+            <a:schemeClr val="accent1"/>
+          </a:lnRef>
+          <a:fillRef idx="0">
+            <a:schemeClr val="accent1"/>
+          </a:fillRef>
+          <a:effectRef idx="0">
+            <a:schemeClr val="accent1"/>
+          </a:effectRef>
+          <a:fontRef idx="minor">
+            <a:schemeClr val="tx1"/>
+          </a:fontRef>
+        </p:style>
+      </p:cxnSp>
     </p:spTree>
     <p:extLst>
       <p:ext uri="{BB962C8B-B14F-4D97-AF65-F5344CB8AC3E}">

</xml_diff>

<commit_message>
color change, fewer bar plot
</commit_message>
<xml_diff>
--- a/figures/LEO+POET_backup_nikita.pptx
+++ b/figures/LEO+POET_backup_nikita.pptx
@@ -12153,6 +12153,12 @@
           <a:prstGeom prst="rect">
             <a:avLst/>
           </a:prstGeom>
+          <a:solidFill>
+            <a:schemeClr val="accent1">
+              <a:lumMod val="60000"/>
+              <a:lumOff val="40000"/>
+            </a:schemeClr>
+          </a:solidFill>
           <a:ln>
             <a:noFill/>
           </a:ln>
@@ -12180,6 +12186,11 @@
             <a:pPr algn="ctr"/>
             <a:r>
               <a:rPr lang="en-US" sz="2000" dirty="0" smtClean="0">
+                <a:solidFill>
+                  <a:schemeClr val="tx2">
+                    <a:lumMod val="75000"/>
+                  </a:schemeClr>
+                </a:solidFill>
                 <a:latin typeface="Times" charset="0"/>
                 <a:ea typeface="Times" charset="0"/>
                 <a:cs typeface="Times" charset="0"/>
@@ -12191,6 +12202,11 @@
             <a:pPr algn="ctr"/>
             <a:r>
               <a:rPr lang="en-US" sz="2000" dirty="0" smtClean="0">
+                <a:solidFill>
+                  <a:schemeClr val="tx2">
+                    <a:lumMod val="75000"/>
+                  </a:schemeClr>
+                </a:solidFill>
                 <a:latin typeface="Times" charset="0"/>
                 <a:ea typeface="Times" charset="0"/>
                 <a:cs typeface="Times" charset="0"/>
@@ -12198,6 +12214,11 @@
               <a:t>System</a:t>
             </a:r>
             <a:endParaRPr lang="en-US" sz="2000" dirty="0">
+              <a:solidFill>
+                <a:schemeClr val="tx2">
+                  <a:lumMod val="75000"/>
+                </a:schemeClr>
+              </a:solidFill>
               <a:latin typeface="Times" charset="0"/>
               <a:ea typeface="Times" charset="0"/>
               <a:cs typeface="Times" charset="0"/>
@@ -12219,6 +12240,12 @@
           <a:prstGeom prst="rect">
             <a:avLst/>
           </a:prstGeom>
+          <a:solidFill>
+            <a:schemeClr val="accent1">
+              <a:lumMod val="60000"/>
+              <a:lumOff val="40000"/>
+            </a:schemeClr>
+          </a:solidFill>
           <a:ln>
             <a:noFill/>
           </a:ln>
@@ -13532,7 +13559,9 @@
             <a:r>
               <a:rPr lang="en-US" sz="1600" dirty="0" smtClean="0">
                 <a:solidFill>
-                  <a:schemeClr val="bg1"/>
+                  <a:schemeClr val="tx2">
+                    <a:lumMod val="75000"/>
+                  </a:schemeClr>
                 </a:solidFill>
                 <a:latin typeface="Times" charset="0"/>
                 <a:ea typeface="Times" charset="0"/>
@@ -13542,7 +13571,9 @@
             </a:r>
             <a:endParaRPr lang="en-US" sz="1600" dirty="0">
               <a:solidFill>
-                <a:schemeClr val="bg1"/>
+                <a:schemeClr val="tx2">
+                  <a:lumMod val="75000"/>
+                </a:schemeClr>
               </a:solidFill>
               <a:latin typeface="Times" charset="0"/>
               <a:ea typeface="Times" charset="0"/>
@@ -13577,7 +13608,9 @@
             <a:r>
               <a:rPr lang="en-US" sz="1600" dirty="0" smtClean="0">
                 <a:solidFill>
-                  <a:schemeClr val="bg1"/>
+                  <a:schemeClr val="tx2">
+                    <a:lumMod val="75000"/>
+                  </a:schemeClr>
                 </a:solidFill>
                 <a:latin typeface="Times" charset="0"/>
                 <a:ea typeface="Times" charset="0"/>
@@ -13587,7 +13620,9 @@
             </a:r>
             <a:endParaRPr lang="en-US" sz="1600" dirty="0">
               <a:solidFill>
-                <a:schemeClr val="bg1"/>
+                <a:schemeClr val="tx2">
+                  <a:lumMod val="75000"/>
+                </a:schemeClr>
               </a:solidFill>
               <a:latin typeface="Times" charset="0"/>
               <a:ea typeface="Times" charset="0"/>
@@ -14876,7 +14911,9 @@
             <a:r>
               <a:rPr lang="en-US" sz="1600" dirty="0" smtClean="0">
                 <a:solidFill>
-                  <a:schemeClr val="bg1"/>
+                  <a:schemeClr val="tx2">
+                    <a:lumMod val="75000"/>
+                  </a:schemeClr>
                 </a:solidFill>
                 <a:latin typeface="Times" charset="0"/>
                 <a:ea typeface="Times" charset="0"/>
@@ -14886,7 +14923,9 @@
             </a:r>
             <a:endParaRPr lang="en-US" sz="1600" dirty="0">
               <a:solidFill>
-                <a:schemeClr val="bg1"/>
+                <a:schemeClr val="tx2">
+                  <a:lumMod val="75000"/>
+                </a:schemeClr>
               </a:solidFill>
               <a:latin typeface="Times" charset="0"/>
               <a:ea typeface="Times" charset="0"/>
@@ -14921,7 +14960,9 @@
             <a:r>
               <a:rPr lang="en-US" sz="1600" dirty="0" smtClean="0">
                 <a:solidFill>
-                  <a:schemeClr val="bg1"/>
+                  <a:schemeClr val="tx2">
+                    <a:lumMod val="75000"/>
+                  </a:schemeClr>
                 </a:solidFill>
                 <a:latin typeface="Times" charset="0"/>
                 <a:ea typeface="Times" charset="0"/>
@@ -14931,7 +14972,9 @@
             </a:r>
             <a:endParaRPr lang="en-US" sz="1600" dirty="0">
               <a:solidFill>
-                <a:schemeClr val="bg1"/>
+                <a:schemeClr val="tx2">
+                  <a:lumMod val="75000"/>
+                </a:schemeClr>
               </a:solidFill>
               <a:latin typeface="Times" charset="0"/>
               <a:ea typeface="Times" charset="0"/>
@@ -14954,6 +14997,12 @@
           <a:prstGeom prst="rect">
             <a:avLst/>
           </a:prstGeom>
+          <a:solidFill>
+            <a:schemeClr val="accent1">
+              <a:lumMod val="60000"/>
+              <a:lumOff val="40000"/>
+            </a:schemeClr>
+          </a:solidFill>
           <a:ln>
             <a:noFill/>
           </a:ln>
@@ -14981,6 +15030,11 @@
             <a:pPr algn="ctr"/>
             <a:r>
               <a:rPr lang="en-US" sz="2000" dirty="0" smtClean="0">
+                <a:solidFill>
+                  <a:schemeClr val="tx2">
+                    <a:lumMod val="75000"/>
+                  </a:schemeClr>
+                </a:solidFill>
                 <a:latin typeface="Times" charset="0"/>
                 <a:ea typeface="Times" charset="0"/>
                 <a:cs typeface="Times" charset="0"/>
@@ -14988,6 +15042,11 @@
               <a:t>Application</a:t>
             </a:r>
             <a:endParaRPr lang="en-US" sz="2000" dirty="0">
+              <a:solidFill>
+                <a:schemeClr val="tx2">
+                  <a:lumMod val="75000"/>
+                </a:schemeClr>
+              </a:solidFill>
               <a:latin typeface="Times" charset="0"/>
               <a:ea typeface="Times" charset="0"/>
               <a:cs typeface="Times" charset="0"/>
@@ -15043,6 +15102,12 @@
           <a:prstGeom prst="ellipse">
             <a:avLst/>
           </a:prstGeom>
+          <a:solidFill>
+            <a:schemeClr val="accent1">
+              <a:lumMod val="60000"/>
+              <a:lumOff val="40000"/>
+            </a:schemeClr>
+          </a:solidFill>
           <a:ln>
             <a:noFill/>
           </a:ln>
@@ -15261,7 +15326,10 @@
             <a:avLst/>
           </a:prstGeom>
           <a:solidFill>
-            <a:schemeClr val="accent1"/>
+            <a:schemeClr val="accent1">
+              <a:lumMod val="60000"/>
+              <a:lumOff val="40000"/>
+            </a:schemeClr>
           </a:solidFill>
           <a:ln>
             <a:noFill/>
@@ -15289,7 +15357,9 @@
             <a:r>
               <a:rPr lang="en-US" sz="2000" dirty="0" smtClean="0">
                 <a:solidFill>
-                  <a:schemeClr val="bg1"/>
+                  <a:schemeClr val="tx2">
+                    <a:lumMod val="75000"/>
+                  </a:schemeClr>
                 </a:solidFill>
                 <a:latin typeface="Times" charset="0"/>
                 <a:ea typeface="Times" charset="0"/>
@@ -15303,7 +15373,9 @@
             <a:r>
               <a:rPr lang="en-US" sz="2000" dirty="0" smtClean="0">
                 <a:solidFill>
-                  <a:schemeClr val="bg1"/>
+                  <a:schemeClr val="tx2">
+                    <a:lumMod val="75000"/>
+                  </a:schemeClr>
                 </a:solidFill>
                 <a:latin typeface="Times" charset="0"/>
                 <a:ea typeface="Times" charset="0"/>

</xml_diff>